<commit_message>
FIne tuning the figures
</commit_message>
<xml_diff>
--- a/PPT_Msc_Capstone.pptx
+++ b/PPT_Msc_Capstone.pptx
@@ -9,6 +9,9 @@
     <p:sldId id="257" r:id="rId3"/>
     <p:sldId id="258" r:id="rId4"/>
     <p:sldId id="259" r:id="rId5"/>
+    <p:sldId id="260" r:id="rId6"/>
+    <p:sldId id="262" r:id="rId7"/>
+    <p:sldId id="261" r:id="rId8"/>
   </p:sldIdLst>
   <p:sldSz cx="12192000" cy="6858000"/>
   <p:notesSz cx="6858000" cy="9144000"/>
@@ -6410,6 +6413,1713 @@
 </p:sld>
 </file>
 
+<file path=ppt/slides/slide5.xml><?xml version="1.0" encoding="utf-8"?>
+<p:sld xmlns:a="http://schemas.openxmlformats.org/drawingml/2006/main" xmlns:r="http://schemas.openxmlformats.org/officeDocument/2006/relationships" xmlns:p="http://schemas.openxmlformats.org/presentationml/2006/main">
+  <p:cSld>
+    <p:spTree>
+      <p:nvGrpSpPr>
+        <p:cNvPr id="1" name=""/>
+        <p:cNvGrpSpPr/>
+        <p:nvPr/>
+      </p:nvGrpSpPr>
+      <p:grpSpPr>
+        <a:xfrm>
+          <a:off x="0" y="0"/>
+          <a:ext cx="0" cy="0"/>
+          <a:chOff x="0" y="0"/>
+          <a:chExt cx="0" cy="0"/>
+        </a:xfrm>
+      </p:grpSpPr>
+      <p:sp>
+        <p:nvSpPr>
+          <p:cNvPr id="3" name="Rectangle 2">
+            <a:extLst>
+              <a:ext uri="{FF2B5EF4-FFF2-40B4-BE49-F238E27FC236}">
+                <a16:creationId xmlns:a16="http://schemas.microsoft.com/office/drawing/2014/main" id="{3B6E2D78-2892-1C04-6C19-FA78FE2E6C20}"/>
+              </a:ext>
+            </a:extLst>
+          </p:cNvPr>
+          <p:cNvSpPr/>
+          <p:nvPr/>
+        </p:nvSpPr>
+        <p:spPr>
+          <a:xfrm>
+            <a:off x="851608" y="695132"/>
+            <a:ext cx="2498082" cy="676467"/>
+          </a:xfrm>
+          <a:prstGeom prst="rect">
+            <a:avLst/>
+          </a:prstGeom>
+          <a:solidFill>
+            <a:schemeClr val="bg1"/>
+          </a:solidFill>
+        </p:spPr>
+        <p:style>
+          <a:lnRef idx="2">
+            <a:schemeClr val="accent1">
+              <a:shade val="15000"/>
+            </a:schemeClr>
+          </a:lnRef>
+          <a:fillRef idx="1">
+            <a:schemeClr val="accent1"/>
+          </a:fillRef>
+          <a:effectRef idx="0">
+            <a:schemeClr val="accent1"/>
+          </a:effectRef>
+          <a:fontRef idx="minor">
+            <a:schemeClr val="lt1"/>
+          </a:fontRef>
+        </p:style>
+        <p:txBody>
+          <a:bodyPr rtlCol="0" anchor="ctr"/>
+          <a:lstStyle/>
+          <a:p>
+            <a:pPr algn="ctr"/>
+            <a:r>
+              <a:rPr lang="en-IE" dirty="0">
+                <a:solidFill>
+                  <a:schemeClr val="tx1"/>
+                </a:solidFill>
+              </a:rPr>
+              <a:t>Check for Trend / Seasonality</a:t>
+            </a:r>
+          </a:p>
+        </p:txBody>
+      </p:sp>
+      <p:sp>
+        <p:nvSpPr>
+          <p:cNvPr id="6" name="Rectangle 5">
+            <a:extLst>
+              <a:ext uri="{FF2B5EF4-FFF2-40B4-BE49-F238E27FC236}">
+                <a16:creationId xmlns:a16="http://schemas.microsoft.com/office/drawing/2014/main" id="{02A4A4C1-19DD-F246-8507-71DD454844B7}"/>
+              </a:ext>
+            </a:extLst>
+          </p:cNvPr>
+          <p:cNvSpPr/>
+          <p:nvPr/>
+        </p:nvSpPr>
+        <p:spPr>
+          <a:xfrm>
+            <a:off x="851608" y="3335697"/>
+            <a:ext cx="2498082" cy="676467"/>
+          </a:xfrm>
+          <a:prstGeom prst="rect">
+            <a:avLst/>
+          </a:prstGeom>
+          <a:solidFill>
+            <a:schemeClr val="bg1"/>
+          </a:solidFill>
+        </p:spPr>
+        <p:style>
+          <a:lnRef idx="2">
+            <a:schemeClr val="accent1">
+              <a:shade val="15000"/>
+            </a:schemeClr>
+          </a:lnRef>
+          <a:fillRef idx="1">
+            <a:schemeClr val="accent1"/>
+          </a:fillRef>
+          <a:effectRef idx="0">
+            <a:schemeClr val="accent1"/>
+          </a:effectRef>
+          <a:fontRef idx="minor">
+            <a:schemeClr val="lt1"/>
+          </a:fontRef>
+        </p:style>
+        <p:txBody>
+          <a:bodyPr rtlCol="0" anchor="ctr"/>
+          <a:lstStyle/>
+          <a:p>
+            <a:pPr algn="ctr"/>
+            <a:r>
+              <a:rPr lang="en-IE" dirty="0">
+                <a:solidFill>
+                  <a:schemeClr val="tx1"/>
+                </a:solidFill>
+              </a:rPr>
+              <a:t>Train/ Test Data</a:t>
+            </a:r>
+          </a:p>
+        </p:txBody>
+      </p:sp>
+      <p:sp>
+        <p:nvSpPr>
+          <p:cNvPr id="7" name="Rectangle 6">
+            <a:extLst>
+              <a:ext uri="{FF2B5EF4-FFF2-40B4-BE49-F238E27FC236}">
+                <a16:creationId xmlns:a16="http://schemas.microsoft.com/office/drawing/2014/main" id="{A97EFD92-0FEE-8EF7-35BB-7B2873D35334}"/>
+              </a:ext>
+            </a:extLst>
+          </p:cNvPr>
+          <p:cNvSpPr/>
+          <p:nvPr/>
+        </p:nvSpPr>
+        <p:spPr>
+          <a:xfrm>
+            <a:off x="851608" y="1907722"/>
+            <a:ext cx="2498082" cy="938115"/>
+          </a:xfrm>
+          <a:prstGeom prst="rect">
+            <a:avLst/>
+          </a:prstGeom>
+          <a:solidFill>
+            <a:schemeClr val="bg1"/>
+          </a:solidFill>
+        </p:spPr>
+        <p:style>
+          <a:lnRef idx="2">
+            <a:schemeClr val="accent1">
+              <a:shade val="15000"/>
+            </a:schemeClr>
+          </a:lnRef>
+          <a:fillRef idx="1">
+            <a:schemeClr val="accent1"/>
+          </a:fillRef>
+          <a:effectRef idx="0">
+            <a:schemeClr val="accent1"/>
+          </a:effectRef>
+          <a:fontRef idx="minor">
+            <a:schemeClr val="lt1"/>
+          </a:fontRef>
+        </p:style>
+        <p:txBody>
+          <a:bodyPr rtlCol="0" anchor="ctr"/>
+          <a:lstStyle/>
+          <a:p>
+            <a:pPr algn="ctr"/>
+            <a:r>
+              <a:rPr lang="en-IE" dirty="0">
+                <a:solidFill>
+                  <a:schemeClr val="tx1"/>
+                </a:solidFill>
+              </a:rPr>
+              <a:t>Create Datasets (Weekly/Monthly/Quarterly/Daily)</a:t>
+            </a:r>
+          </a:p>
+        </p:txBody>
+      </p:sp>
+      <p:sp>
+        <p:nvSpPr>
+          <p:cNvPr id="8" name="Rectangle 7">
+            <a:extLst>
+              <a:ext uri="{FF2B5EF4-FFF2-40B4-BE49-F238E27FC236}">
+                <a16:creationId xmlns:a16="http://schemas.microsoft.com/office/drawing/2014/main" id="{24BC2F2F-DC6A-6F88-7B9C-EA52BFF56819}"/>
+              </a:ext>
+            </a:extLst>
+          </p:cNvPr>
+          <p:cNvSpPr/>
+          <p:nvPr/>
+        </p:nvSpPr>
+        <p:spPr>
+          <a:xfrm>
+            <a:off x="4288383" y="2659230"/>
+            <a:ext cx="2498082" cy="676467"/>
+          </a:xfrm>
+          <a:prstGeom prst="rect">
+            <a:avLst/>
+          </a:prstGeom>
+          <a:solidFill>
+            <a:schemeClr val="bg1"/>
+          </a:solidFill>
+        </p:spPr>
+        <p:style>
+          <a:lnRef idx="2">
+            <a:schemeClr val="accent1">
+              <a:shade val="15000"/>
+            </a:schemeClr>
+          </a:lnRef>
+          <a:fillRef idx="1">
+            <a:schemeClr val="accent1"/>
+          </a:fillRef>
+          <a:effectRef idx="0">
+            <a:schemeClr val="accent1"/>
+          </a:effectRef>
+          <a:fontRef idx="minor">
+            <a:schemeClr val="lt1"/>
+          </a:fontRef>
+        </p:style>
+        <p:txBody>
+          <a:bodyPr rtlCol="0" anchor="ctr"/>
+          <a:lstStyle/>
+          <a:p>
+            <a:pPr algn="ctr"/>
+            <a:r>
+              <a:rPr lang="en-IE" dirty="0">
+                <a:solidFill>
+                  <a:schemeClr val="tx1"/>
+                </a:solidFill>
+              </a:rPr>
+              <a:t>Traditional Models (Example: ARMA)</a:t>
+            </a:r>
+          </a:p>
+        </p:txBody>
+      </p:sp>
+      <p:sp>
+        <p:nvSpPr>
+          <p:cNvPr id="9" name="Rectangle 8">
+            <a:extLst>
+              <a:ext uri="{FF2B5EF4-FFF2-40B4-BE49-F238E27FC236}">
+                <a16:creationId xmlns:a16="http://schemas.microsoft.com/office/drawing/2014/main" id="{8AC53CFD-2CE5-6169-A6AC-C496E42F7C75}"/>
+              </a:ext>
+            </a:extLst>
+          </p:cNvPr>
+          <p:cNvSpPr/>
+          <p:nvPr/>
+        </p:nvSpPr>
+        <p:spPr>
+          <a:xfrm>
+            <a:off x="4288383" y="3900196"/>
+            <a:ext cx="2498082" cy="676467"/>
+          </a:xfrm>
+          <a:prstGeom prst="rect">
+            <a:avLst/>
+          </a:prstGeom>
+          <a:solidFill>
+            <a:schemeClr val="bg1"/>
+          </a:solidFill>
+        </p:spPr>
+        <p:style>
+          <a:lnRef idx="2">
+            <a:schemeClr val="accent1">
+              <a:shade val="15000"/>
+            </a:schemeClr>
+          </a:lnRef>
+          <a:fillRef idx="1">
+            <a:schemeClr val="accent1"/>
+          </a:fillRef>
+          <a:effectRef idx="0">
+            <a:schemeClr val="accent1"/>
+          </a:effectRef>
+          <a:fontRef idx="minor">
+            <a:schemeClr val="lt1"/>
+          </a:fontRef>
+        </p:style>
+        <p:txBody>
+          <a:bodyPr rtlCol="0" anchor="ctr"/>
+          <a:lstStyle/>
+          <a:p>
+            <a:pPr algn="ctr"/>
+            <a:r>
+              <a:rPr lang="en-IE" dirty="0">
+                <a:solidFill>
+                  <a:schemeClr val="tx1"/>
+                </a:solidFill>
+              </a:rPr>
+              <a:t>Regression Models)</a:t>
+            </a:r>
+          </a:p>
+        </p:txBody>
+      </p:sp>
+      <p:sp>
+        <p:nvSpPr>
+          <p:cNvPr id="10" name="Rectangle 9">
+            <a:extLst>
+              <a:ext uri="{FF2B5EF4-FFF2-40B4-BE49-F238E27FC236}">
+                <a16:creationId xmlns:a16="http://schemas.microsoft.com/office/drawing/2014/main" id="{2734159C-00F3-38E1-8AA0-5202860A9C24}"/>
+              </a:ext>
+            </a:extLst>
+          </p:cNvPr>
+          <p:cNvSpPr/>
+          <p:nvPr/>
+        </p:nvSpPr>
+        <p:spPr>
+          <a:xfrm>
+            <a:off x="7296539" y="3335696"/>
+            <a:ext cx="1698171" cy="564500"/>
+          </a:xfrm>
+          <a:prstGeom prst="rect">
+            <a:avLst/>
+          </a:prstGeom>
+          <a:solidFill>
+            <a:schemeClr val="bg1"/>
+          </a:solidFill>
+        </p:spPr>
+        <p:style>
+          <a:lnRef idx="2">
+            <a:schemeClr val="accent1">
+              <a:shade val="15000"/>
+            </a:schemeClr>
+          </a:lnRef>
+          <a:fillRef idx="1">
+            <a:schemeClr val="accent1"/>
+          </a:fillRef>
+          <a:effectRef idx="0">
+            <a:schemeClr val="accent1"/>
+          </a:effectRef>
+          <a:fontRef idx="minor">
+            <a:schemeClr val="lt1"/>
+          </a:fontRef>
+        </p:style>
+        <p:txBody>
+          <a:bodyPr rtlCol="0" anchor="ctr"/>
+          <a:lstStyle/>
+          <a:p>
+            <a:pPr algn="ctr"/>
+            <a:r>
+              <a:rPr lang="en-IE" dirty="0">
+                <a:solidFill>
+                  <a:schemeClr val="tx1"/>
+                </a:solidFill>
+              </a:rPr>
+              <a:t>Evaluate Models </a:t>
+            </a:r>
+          </a:p>
+        </p:txBody>
+      </p:sp>
+      <p:sp>
+        <p:nvSpPr>
+          <p:cNvPr id="11" name="Rectangle 10">
+            <a:extLst>
+              <a:ext uri="{FF2B5EF4-FFF2-40B4-BE49-F238E27FC236}">
+                <a16:creationId xmlns:a16="http://schemas.microsoft.com/office/drawing/2014/main" id="{03ED0361-4DC7-78C5-8DE8-B30F2B2014FB}"/>
+              </a:ext>
+            </a:extLst>
+          </p:cNvPr>
+          <p:cNvSpPr/>
+          <p:nvPr/>
+        </p:nvSpPr>
+        <p:spPr>
+          <a:xfrm>
+            <a:off x="9504784" y="3181740"/>
+            <a:ext cx="1698171" cy="830424"/>
+          </a:xfrm>
+          <a:prstGeom prst="rect">
+            <a:avLst/>
+          </a:prstGeom>
+          <a:solidFill>
+            <a:schemeClr val="bg1"/>
+          </a:solidFill>
+        </p:spPr>
+        <p:style>
+          <a:lnRef idx="2">
+            <a:schemeClr val="accent1">
+              <a:shade val="15000"/>
+            </a:schemeClr>
+          </a:lnRef>
+          <a:fillRef idx="1">
+            <a:schemeClr val="accent1"/>
+          </a:fillRef>
+          <a:effectRef idx="0">
+            <a:schemeClr val="accent1"/>
+          </a:effectRef>
+          <a:fontRef idx="minor">
+            <a:schemeClr val="lt1"/>
+          </a:fontRef>
+        </p:style>
+        <p:txBody>
+          <a:bodyPr rtlCol="0" anchor="ctr"/>
+          <a:lstStyle/>
+          <a:p>
+            <a:pPr algn="ctr"/>
+            <a:r>
+              <a:rPr lang="en-IE" dirty="0">
+                <a:solidFill>
+                  <a:schemeClr val="tx1"/>
+                </a:solidFill>
+              </a:rPr>
+              <a:t>Hyper-Parameter Tuning</a:t>
+            </a:r>
+          </a:p>
+        </p:txBody>
+      </p:sp>
+      <p:cxnSp>
+        <p:nvCxnSpPr>
+          <p:cNvPr id="13" name="Straight Arrow Connector 12">
+            <a:extLst>
+              <a:ext uri="{FF2B5EF4-FFF2-40B4-BE49-F238E27FC236}">
+                <a16:creationId xmlns:a16="http://schemas.microsoft.com/office/drawing/2014/main" id="{771A054F-3878-BF2E-2B57-2AD524A03B8C}"/>
+              </a:ext>
+            </a:extLst>
+          </p:cNvPr>
+          <p:cNvCxnSpPr>
+            <a:stCxn id="3" idx="2"/>
+            <a:endCxn id="7" idx="0"/>
+          </p:cNvCxnSpPr>
+          <p:nvPr/>
+        </p:nvCxnSpPr>
+        <p:spPr>
+          <a:xfrm>
+            <a:off x="2100649" y="1371599"/>
+            <a:ext cx="0" cy="536123"/>
+          </a:xfrm>
+          <a:prstGeom prst="straightConnector1">
+            <a:avLst/>
+          </a:prstGeom>
+          <a:ln>
+            <a:tailEnd type="triangle"/>
+          </a:ln>
+        </p:spPr>
+        <p:style>
+          <a:lnRef idx="1">
+            <a:schemeClr val="accent1"/>
+          </a:lnRef>
+          <a:fillRef idx="0">
+            <a:schemeClr val="accent1"/>
+          </a:fillRef>
+          <a:effectRef idx="0">
+            <a:schemeClr val="accent1"/>
+          </a:effectRef>
+          <a:fontRef idx="minor">
+            <a:schemeClr val="tx1"/>
+          </a:fontRef>
+        </p:style>
+      </p:cxnSp>
+      <p:cxnSp>
+        <p:nvCxnSpPr>
+          <p:cNvPr id="15" name="Straight Arrow Connector 14">
+            <a:extLst>
+              <a:ext uri="{FF2B5EF4-FFF2-40B4-BE49-F238E27FC236}">
+                <a16:creationId xmlns:a16="http://schemas.microsoft.com/office/drawing/2014/main" id="{4527A180-A49A-0BD1-E403-EB53849FD469}"/>
+              </a:ext>
+            </a:extLst>
+          </p:cNvPr>
+          <p:cNvCxnSpPr>
+            <a:stCxn id="7" idx="2"/>
+            <a:endCxn id="6" idx="0"/>
+          </p:cNvCxnSpPr>
+          <p:nvPr/>
+        </p:nvCxnSpPr>
+        <p:spPr>
+          <a:xfrm>
+            <a:off x="2100649" y="2845837"/>
+            <a:ext cx="0" cy="489860"/>
+          </a:xfrm>
+          <a:prstGeom prst="straightConnector1">
+            <a:avLst/>
+          </a:prstGeom>
+          <a:ln>
+            <a:tailEnd type="triangle"/>
+          </a:ln>
+        </p:spPr>
+        <p:style>
+          <a:lnRef idx="1">
+            <a:schemeClr val="accent1"/>
+          </a:lnRef>
+          <a:fillRef idx="0">
+            <a:schemeClr val="accent1"/>
+          </a:fillRef>
+          <a:effectRef idx="0">
+            <a:schemeClr val="accent1"/>
+          </a:effectRef>
+          <a:fontRef idx="minor">
+            <a:schemeClr val="tx1"/>
+          </a:fontRef>
+        </p:style>
+      </p:cxnSp>
+      <p:cxnSp>
+        <p:nvCxnSpPr>
+          <p:cNvPr id="17" name="Straight Arrow Connector 16">
+            <a:extLst>
+              <a:ext uri="{FF2B5EF4-FFF2-40B4-BE49-F238E27FC236}">
+                <a16:creationId xmlns:a16="http://schemas.microsoft.com/office/drawing/2014/main" id="{86B656AE-B7F9-09A7-ED42-8D861CA7B1F0}"/>
+              </a:ext>
+            </a:extLst>
+          </p:cNvPr>
+          <p:cNvCxnSpPr>
+            <a:stCxn id="6" idx="3"/>
+            <a:endCxn id="8" idx="1"/>
+          </p:cNvCxnSpPr>
+          <p:nvPr/>
+        </p:nvCxnSpPr>
+        <p:spPr>
+          <a:xfrm flipV="1">
+            <a:off x="3349690" y="2997464"/>
+            <a:ext cx="938693" cy="676467"/>
+          </a:xfrm>
+          <a:prstGeom prst="straightConnector1">
+            <a:avLst/>
+          </a:prstGeom>
+          <a:ln>
+            <a:tailEnd type="triangle"/>
+          </a:ln>
+        </p:spPr>
+        <p:style>
+          <a:lnRef idx="1">
+            <a:schemeClr val="accent1"/>
+          </a:lnRef>
+          <a:fillRef idx="0">
+            <a:schemeClr val="accent1"/>
+          </a:fillRef>
+          <a:effectRef idx="0">
+            <a:schemeClr val="accent1"/>
+          </a:effectRef>
+          <a:fontRef idx="minor">
+            <a:schemeClr val="tx1"/>
+          </a:fontRef>
+        </p:style>
+      </p:cxnSp>
+      <p:cxnSp>
+        <p:nvCxnSpPr>
+          <p:cNvPr id="19" name="Straight Arrow Connector 18">
+            <a:extLst>
+              <a:ext uri="{FF2B5EF4-FFF2-40B4-BE49-F238E27FC236}">
+                <a16:creationId xmlns:a16="http://schemas.microsoft.com/office/drawing/2014/main" id="{7D432DAC-21CE-61D1-83B9-5C1608093428}"/>
+              </a:ext>
+            </a:extLst>
+          </p:cNvPr>
+          <p:cNvCxnSpPr>
+            <a:stCxn id="6" idx="3"/>
+            <a:endCxn id="9" idx="1"/>
+          </p:cNvCxnSpPr>
+          <p:nvPr/>
+        </p:nvCxnSpPr>
+        <p:spPr>
+          <a:xfrm>
+            <a:off x="3349690" y="3673931"/>
+            <a:ext cx="938693" cy="564499"/>
+          </a:xfrm>
+          <a:prstGeom prst="straightConnector1">
+            <a:avLst/>
+          </a:prstGeom>
+          <a:ln>
+            <a:tailEnd type="triangle"/>
+          </a:ln>
+        </p:spPr>
+        <p:style>
+          <a:lnRef idx="1">
+            <a:schemeClr val="accent1"/>
+          </a:lnRef>
+          <a:fillRef idx="0">
+            <a:schemeClr val="accent1"/>
+          </a:fillRef>
+          <a:effectRef idx="0">
+            <a:schemeClr val="accent1"/>
+          </a:effectRef>
+          <a:fontRef idx="minor">
+            <a:schemeClr val="tx1"/>
+          </a:fontRef>
+        </p:style>
+      </p:cxnSp>
+      <p:cxnSp>
+        <p:nvCxnSpPr>
+          <p:cNvPr id="21" name="Straight Arrow Connector 20">
+            <a:extLst>
+              <a:ext uri="{FF2B5EF4-FFF2-40B4-BE49-F238E27FC236}">
+                <a16:creationId xmlns:a16="http://schemas.microsoft.com/office/drawing/2014/main" id="{45A2CA5F-7361-9B8F-2406-DBC38833E877}"/>
+              </a:ext>
+            </a:extLst>
+          </p:cNvPr>
+          <p:cNvCxnSpPr>
+            <a:stCxn id="8" idx="3"/>
+            <a:endCxn id="10" idx="1"/>
+          </p:cNvCxnSpPr>
+          <p:nvPr/>
+        </p:nvCxnSpPr>
+        <p:spPr>
+          <a:xfrm>
+            <a:off x="6786465" y="2997464"/>
+            <a:ext cx="510074" cy="620482"/>
+          </a:xfrm>
+          <a:prstGeom prst="straightConnector1">
+            <a:avLst/>
+          </a:prstGeom>
+          <a:ln>
+            <a:tailEnd type="triangle"/>
+          </a:ln>
+        </p:spPr>
+        <p:style>
+          <a:lnRef idx="1">
+            <a:schemeClr val="accent1"/>
+          </a:lnRef>
+          <a:fillRef idx="0">
+            <a:schemeClr val="accent1"/>
+          </a:fillRef>
+          <a:effectRef idx="0">
+            <a:schemeClr val="accent1"/>
+          </a:effectRef>
+          <a:fontRef idx="minor">
+            <a:schemeClr val="tx1"/>
+          </a:fontRef>
+        </p:style>
+      </p:cxnSp>
+      <p:cxnSp>
+        <p:nvCxnSpPr>
+          <p:cNvPr id="23" name="Straight Arrow Connector 22">
+            <a:extLst>
+              <a:ext uri="{FF2B5EF4-FFF2-40B4-BE49-F238E27FC236}">
+                <a16:creationId xmlns:a16="http://schemas.microsoft.com/office/drawing/2014/main" id="{B1A0E837-BD14-AA6C-B635-B43B9C4BF113}"/>
+              </a:ext>
+            </a:extLst>
+          </p:cNvPr>
+          <p:cNvCxnSpPr>
+            <a:stCxn id="9" idx="3"/>
+            <a:endCxn id="10" idx="1"/>
+          </p:cNvCxnSpPr>
+          <p:nvPr/>
+        </p:nvCxnSpPr>
+        <p:spPr>
+          <a:xfrm flipV="1">
+            <a:off x="6786465" y="3617946"/>
+            <a:ext cx="510074" cy="620484"/>
+          </a:xfrm>
+          <a:prstGeom prst="straightConnector1">
+            <a:avLst/>
+          </a:prstGeom>
+          <a:ln>
+            <a:tailEnd type="triangle"/>
+          </a:ln>
+        </p:spPr>
+        <p:style>
+          <a:lnRef idx="1">
+            <a:schemeClr val="accent1"/>
+          </a:lnRef>
+          <a:fillRef idx="0">
+            <a:schemeClr val="accent1"/>
+          </a:fillRef>
+          <a:effectRef idx="0">
+            <a:schemeClr val="accent1"/>
+          </a:effectRef>
+          <a:fontRef idx="minor">
+            <a:schemeClr val="tx1"/>
+          </a:fontRef>
+        </p:style>
+      </p:cxnSp>
+      <p:cxnSp>
+        <p:nvCxnSpPr>
+          <p:cNvPr id="25" name="Straight Arrow Connector 24">
+            <a:extLst>
+              <a:ext uri="{FF2B5EF4-FFF2-40B4-BE49-F238E27FC236}">
+                <a16:creationId xmlns:a16="http://schemas.microsoft.com/office/drawing/2014/main" id="{60F7B129-3ED1-0C2B-EBBF-DD23E595C67F}"/>
+              </a:ext>
+            </a:extLst>
+          </p:cNvPr>
+          <p:cNvCxnSpPr>
+            <a:stCxn id="10" idx="3"/>
+            <a:endCxn id="11" idx="1"/>
+          </p:cNvCxnSpPr>
+          <p:nvPr/>
+        </p:nvCxnSpPr>
+        <p:spPr>
+          <a:xfrm flipV="1">
+            <a:off x="8994710" y="3596952"/>
+            <a:ext cx="510074" cy="20994"/>
+          </a:xfrm>
+          <a:prstGeom prst="straightConnector1">
+            <a:avLst/>
+          </a:prstGeom>
+          <a:ln>
+            <a:tailEnd type="triangle"/>
+          </a:ln>
+        </p:spPr>
+        <p:style>
+          <a:lnRef idx="1">
+            <a:schemeClr val="accent1"/>
+          </a:lnRef>
+          <a:fillRef idx="0">
+            <a:schemeClr val="accent1"/>
+          </a:fillRef>
+          <a:effectRef idx="0">
+            <a:schemeClr val="accent1"/>
+          </a:effectRef>
+          <a:fontRef idx="minor">
+            <a:schemeClr val="tx1"/>
+          </a:fontRef>
+        </p:style>
+      </p:cxnSp>
+      <p:sp>
+        <p:nvSpPr>
+          <p:cNvPr id="26" name="Rectangle 25">
+            <a:extLst>
+              <a:ext uri="{FF2B5EF4-FFF2-40B4-BE49-F238E27FC236}">
+                <a16:creationId xmlns:a16="http://schemas.microsoft.com/office/drawing/2014/main" id="{E691B300-4EE0-FCF3-6843-CBD9978C738E}"/>
+              </a:ext>
+            </a:extLst>
+          </p:cNvPr>
+          <p:cNvSpPr/>
+          <p:nvPr/>
+        </p:nvSpPr>
+        <p:spPr>
+          <a:xfrm>
+            <a:off x="4808376" y="5736773"/>
+            <a:ext cx="1698171" cy="564500"/>
+          </a:xfrm>
+          <a:prstGeom prst="rect">
+            <a:avLst/>
+          </a:prstGeom>
+          <a:solidFill>
+            <a:schemeClr val="bg1"/>
+          </a:solidFill>
+        </p:spPr>
+        <p:style>
+          <a:lnRef idx="2">
+            <a:schemeClr val="accent1">
+              <a:shade val="15000"/>
+            </a:schemeClr>
+          </a:lnRef>
+          <a:fillRef idx="1">
+            <a:schemeClr val="accent1"/>
+          </a:fillRef>
+          <a:effectRef idx="0">
+            <a:schemeClr val="accent1"/>
+          </a:effectRef>
+          <a:fontRef idx="minor">
+            <a:schemeClr val="lt1"/>
+          </a:fontRef>
+        </p:style>
+        <p:txBody>
+          <a:bodyPr rtlCol="0" anchor="ctr"/>
+          <a:lstStyle/>
+          <a:p>
+            <a:pPr algn="ctr"/>
+            <a:r>
+              <a:rPr lang="en-IE" dirty="0">
+                <a:solidFill>
+                  <a:schemeClr val="tx1"/>
+                </a:solidFill>
+              </a:rPr>
+              <a:t>Data Preparation</a:t>
+            </a:r>
+          </a:p>
+        </p:txBody>
+      </p:sp>
+      <p:cxnSp>
+        <p:nvCxnSpPr>
+          <p:cNvPr id="28" name="Straight Connector 27">
+            <a:extLst>
+              <a:ext uri="{FF2B5EF4-FFF2-40B4-BE49-F238E27FC236}">
+                <a16:creationId xmlns:a16="http://schemas.microsoft.com/office/drawing/2014/main" id="{DE92D5AD-65E1-3EE3-809A-0B0F89B49F2B}"/>
+              </a:ext>
+            </a:extLst>
+          </p:cNvPr>
+          <p:cNvCxnSpPr>
+            <a:cxnSpLocks/>
+            <a:stCxn id="11" idx="2"/>
+          </p:cNvCxnSpPr>
+          <p:nvPr/>
+        </p:nvCxnSpPr>
+        <p:spPr>
+          <a:xfrm>
+            <a:off x="10353870" y="4012164"/>
+            <a:ext cx="0" cy="2006859"/>
+          </a:xfrm>
+          <a:prstGeom prst="line">
+            <a:avLst/>
+          </a:prstGeom>
+        </p:spPr>
+        <p:style>
+          <a:lnRef idx="1">
+            <a:schemeClr val="accent1"/>
+          </a:lnRef>
+          <a:fillRef idx="0">
+            <a:schemeClr val="accent1"/>
+          </a:fillRef>
+          <a:effectRef idx="0">
+            <a:schemeClr val="accent1"/>
+          </a:effectRef>
+          <a:fontRef idx="minor">
+            <a:schemeClr val="tx1"/>
+          </a:fontRef>
+        </p:style>
+      </p:cxnSp>
+      <p:cxnSp>
+        <p:nvCxnSpPr>
+          <p:cNvPr id="31" name="Straight Arrow Connector 30">
+            <a:extLst>
+              <a:ext uri="{FF2B5EF4-FFF2-40B4-BE49-F238E27FC236}">
+                <a16:creationId xmlns:a16="http://schemas.microsoft.com/office/drawing/2014/main" id="{E6DAD78B-3702-6855-20A1-C2ED5B95B26C}"/>
+              </a:ext>
+            </a:extLst>
+          </p:cNvPr>
+          <p:cNvCxnSpPr>
+            <a:endCxn id="26" idx="3"/>
+          </p:cNvCxnSpPr>
+          <p:nvPr/>
+        </p:nvCxnSpPr>
+        <p:spPr>
+          <a:xfrm flipH="1">
+            <a:off x="6506547" y="6019023"/>
+            <a:ext cx="3847322" cy="0"/>
+          </a:xfrm>
+          <a:prstGeom prst="straightConnector1">
+            <a:avLst/>
+          </a:prstGeom>
+          <a:ln>
+            <a:tailEnd type="triangle"/>
+          </a:ln>
+        </p:spPr>
+        <p:style>
+          <a:lnRef idx="1">
+            <a:schemeClr val="accent1"/>
+          </a:lnRef>
+          <a:fillRef idx="0">
+            <a:schemeClr val="accent1"/>
+          </a:fillRef>
+          <a:effectRef idx="0">
+            <a:schemeClr val="accent1"/>
+          </a:effectRef>
+          <a:fontRef idx="minor">
+            <a:schemeClr val="tx1"/>
+          </a:fontRef>
+        </p:style>
+      </p:cxnSp>
+      <p:cxnSp>
+        <p:nvCxnSpPr>
+          <p:cNvPr id="33" name="Straight Connector 32">
+            <a:extLst>
+              <a:ext uri="{FF2B5EF4-FFF2-40B4-BE49-F238E27FC236}">
+                <a16:creationId xmlns:a16="http://schemas.microsoft.com/office/drawing/2014/main" id="{5426C929-3515-9D3C-21CE-EFCE3B21174F}"/>
+              </a:ext>
+            </a:extLst>
+          </p:cNvPr>
+          <p:cNvCxnSpPr>
+            <a:cxnSpLocks/>
+            <a:stCxn id="26" idx="1"/>
+          </p:cNvCxnSpPr>
+          <p:nvPr/>
+        </p:nvCxnSpPr>
+        <p:spPr>
+          <a:xfrm flipH="1">
+            <a:off x="2100649" y="6019023"/>
+            <a:ext cx="2707727" cy="0"/>
+          </a:xfrm>
+          <a:prstGeom prst="line">
+            <a:avLst/>
+          </a:prstGeom>
+        </p:spPr>
+        <p:style>
+          <a:lnRef idx="1">
+            <a:schemeClr val="accent1"/>
+          </a:lnRef>
+          <a:fillRef idx="0">
+            <a:schemeClr val="accent1"/>
+          </a:fillRef>
+          <a:effectRef idx="0">
+            <a:schemeClr val="accent1"/>
+          </a:effectRef>
+          <a:fontRef idx="minor">
+            <a:schemeClr val="tx1"/>
+          </a:fontRef>
+        </p:style>
+      </p:cxnSp>
+      <p:cxnSp>
+        <p:nvCxnSpPr>
+          <p:cNvPr id="35" name="Straight Arrow Connector 34">
+            <a:extLst>
+              <a:ext uri="{FF2B5EF4-FFF2-40B4-BE49-F238E27FC236}">
+                <a16:creationId xmlns:a16="http://schemas.microsoft.com/office/drawing/2014/main" id="{855D3888-3F74-F3A9-0A23-752611D04D77}"/>
+              </a:ext>
+            </a:extLst>
+          </p:cNvPr>
+          <p:cNvCxnSpPr>
+            <a:cxnSpLocks/>
+            <a:endCxn id="6" idx="2"/>
+          </p:cNvCxnSpPr>
+          <p:nvPr/>
+        </p:nvCxnSpPr>
+        <p:spPr>
+          <a:xfrm flipV="1">
+            <a:off x="2100649" y="4012164"/>
+            <a:ext cx="0" cy="2006859"/>
+          </a:xfrm>
+          <a:prstGeom prst="straightConnector1">
+            <a:avLst/>
+          </a:prstGeom>
+          <a:ln>
+            <a:tailEnd type="triangle"/>
+          </a:ln>
+        </p:spPr>
+        <p:style>
+          <a:lnRef idx="1">
+            <a:schemeClr val="accent1"/>
+          </a:lnRef>
+          <a:fillRef idx="0">
+            <a:schemeClr val="accent1"/>
+          </a:fillRef>
+          <a:effectRef idx="0">
+            <a:schemeClr val="accent1"/>
+          </a:effectRef>
+          <a:fontRef idx="minor">
+            <a:schemeClr val="tx1"/>
+          </a:fontRef>
+        </p:style>
+      </p:cxnSp>
+    </p:spTree>
+    <p:extLst>
+      <p:ext uri="{BB962C8B-B14F-4D97-AF65-F5344CB8AC3E}">
+        <p14:creationId xmlns:p14="http://schemas.microsoft.com/office/powerpoint/2010/main" val="780629468"/>
+      </p:ext>
+    </p:extLst>
+  </p:cSld>
+  <p:clrMapOvr>
+    <a:masterClrMapping/>
+  </p:clrMapOvr>
+</p:sld>
+</file>
+
+<file path=ppt/slides/slide6.xml><?xml version="1.0" encoding="utf-8"?>
+<p:sld xmlns:a="http://schemas.openxmlformats.org/drawingml/2006/main" xmlns:r="http://schemas.openxmlformats.org/officeDocument/2006/relationships" xmlns:p="http://schemas.openxmlformats.org/presentationml/2006/main">
+  <p:cSld>
+    <p:spTree>
+      <p:nvGrpSpPr>
+        <p:cNvPr id="1" name=""/>
+        <p:cNvGrpSpPr/>
+        <p:nvPr/>
+      </p:nvGrpSpPr>
+      <p:grpSpPr>
+        <a:xfrm>
+          <a:off x="0" y="0"/>
+          <a:ext cx="0" cy="0"/>
+          <a:chOff x="0" y="0"/>
+          <a:chExt cx="0" cy="0"/>
+        </a:xfrm>
+      </p:grpSpPr>
+      <p:sp>
+        <p:nvSpPr>
+          <p:cNvPr id="6" name="Rectangle 5">
+            <a:extLst>
+              <a:ext uri="{FF2B5EF4-FFF2-40B4-BE49-F238E27FC236}">
+                <a16:creationId xmlns:a16="http://schemas.microsoft.com/office/drawing/2014/main" id="{02A4A4C1-19DD-F246-8507-71DD454844B7}"/>
+              </a:ext>
+            </a:extLst>
+          </p:cNvPr>
+          <p:cNvSpPr/>
+          <p:nvPr/>
+        </p:nvSpPr>
+        <p:spPr>
+          <a:xfrm>
+            <a:off x="851608" y="3335697"/>
+            <a:ext cx="2498082" cy="676467"/>
+          </a:xfrm>
+          <a:prstGeom prst="rect">
+            <a:avLst/>
+          </a:prstGeom>
+          <a:solidFill>
+            <a:schemeClr val="bg1"/>
+          </a:solidFill>
+        </p:spPr>
+        <p:style>
+          <a:lnRef idx="2">
+            <a:schemeClr val="accent1">
+              <a:shade val="15000"/>
+            </a:schemeClr>
+          </a:lnRef>
+          <a:fillRef idx="1">
+            <a:schemeClr val="accent1"/>
+          </a:fillRef>
+          <a:effectRef idx="0">
+            <a:schemeClr val="accent1"/>
+          </a:effectRef>
+          <a:fontRef idx="minor">
+            <a:schemeClr val="lt1"/>
+          </a:fontRef>
+        </p:style>
+        <p:txBody>
+          <a:bodyPr rtlCol="0" anchor="ctr"/>
+          <a:lstStyle/>
+          <a:p>
+            <a:pPr algn="ctr"/>
+            <a:r>
+              <a:rPr lang="en-IE" dirty="0">
+                <a:solidFill>
+                  <a:schemeClr val="tx1"/>
+                </a:solidFill>
+              </a:rPr>
+              <a:t>Train/ Test Data</a:t>
+            </a:r>
+          </a:p>
+        </p:txBody>
+      </p:sp>
+      <p:sp>
+        <p:nvSpPr>
+          <p:cNvPr id="7" name="Rectangle 6">
+            <a:extLst>
+              <a:ext uri="{FF2B5EF4-FFF2-40B4-BE49-F238E27FC236}">
+                <a16:creationId xmlns:a16="http://schemas.microsoft.com/office/drawing/2014/main" id="{A97EFD92-0FEE-8EF7-35BB-7B2873D35334}"/>
+              </a:ext>
+            </a:extLst>
+          </p:cNvPr>
+          <p:cNvSpPr/>
+          <p:nvPr/>
+        </p:nvSpPr>
+        <p:spPr>
+          <a:xfrm>
+            <a:off x="851608" y="1907722"/>
+            <a:ext cx="2498082" cy="938115"/>
+          </a:xfrm>
+          <a:prstGeom prst="rect">
+            <a:avLst/>
+          </a:prstGeom>
+          <a:solidFill>
+            <a:schemeClr val="bg1"/>
+          </a:solidFill>
+        </p:spPr>
+        <p:style>
+          <a:lnRef idx="2">
+            <a:schemeClr val="accent1">
+              <a:shade val="15000"/>
+            </a:schemeClr>
+          </a:lnRef>
+          <a:fillRef idx="1">
+            <a:schemeClr val="accent1"/>
+          </a:fillRef>
+          <a:effectRef idx="0">
+            <a:schemeClr val="accent1"/>
+          </a:effectRef>
+          <a:fontRef idx="minor">
+            <a:schemeClr val="lt1"/>
+          </a:fontRef>
+        </p:style>
+        <p:txBody>
+          <a:bodyPr rtlCol="0" anchor="ctr"/>
+          <a:lstStyle/>
+          <a:p>
+            <a:pPr algn="ctr"/>
+            <a:r>
+              <a:rPr lang="en-IE" dirty="0">
+                <a:solidFill>
+                  <a:schemeClr val="tx1"/>
+                </a:solidFill>
+              </a:rPr>
+              <a:t>Create Datasets (Weekly/Monthly/Quarterly/Daily)</a:t>
+            </a:r>
+          </a:p>
+        </p:txBody>
+      </p:sp>
+      <p:sp>
+        <p:nvSpPr>
+          <p:cNvPr id="9" name="Rectangle 8">
+            <a:extLst>
+              <a:ext uri="{FF2B5EF4-FFF2-40B4-BE49-F238E27FC236}">
+                <a16:creationId xmlns:a16="http://schemas.microsoft.com/office/drawing/2014/main" id="{8AC53CFD-2CE5-6169-A6AC-C496E42F7C75}"/>
+              </a:ext>
+            </a:extLst>
+          </p:cNvPr>
+          <p:cNvSpPr/>
+          <p:nvPr/>
+        </p:nvSpPr>
+        <p:spPr>
+          <a:xfrm>
+            <a:off x="4288383" y="3335697"/>
+            <a:ext cx="2498082" cy="676467"/>
+          </a:xfrm>
+          <a:prstGeom prst="rect">
+            <a:avLst/>
+          </a:prstGeom>
+          <a:solidFill>
+            <a:schemeClr val="bg1"/>
+          </a:solidFill>
+        </p:spPr>
+        <p:style>
+          <a:lnRef idx="2">
+            <a:schemeClr val="accent1">
+              <a:shade val="15000"/>
+            </a:schemeClr>
+          </a:lnRef>
+          <a:fillRef idx="1">
+            <a:schemeClr val="accent1"/>
+          </a:fillRef>
+          <a:effectRef idx="0">
+            <a:schemeClr val="accent1"/>
+          </a:effectRef>
+          <a:fontRef idx="minor">
+            <a:schemeClr val="lt1"/>
+          </a:fontRef>
+        </p:style>
+        <p:txBody>
+          <a:bodyPr rtlCol="0" anchor="ctr"/>
+          <a:lstStyle/>
+          <a:p>
+            <a:pPr algn="ctr"/>
+            <a:r>
+              <a:rPr lang="en-IE" dirty="0">
+                <a:solidFill>
+                  <a:schemeClr val="tx1"/>
+                </a:solidFill>
+              </a:rPr>
+              <a:t>Regression Models)</a:t>
+            </a:r>
+          </a:p>
+        </p:txBody>
+      </p:sp>
+      <p:sp>
+        <p:nvSpPr>
+          <p:cNvPr id="10" name="Rectangle 9">
+            <a:extLst>
+              <a:ext uri="{FF2B5EF4-FFF2-40B4-BE49-F238E27FC236}">
+                <a16:creationId xmlns:a16="http://schemas.microsoft.com/office/drawing/2014/main" id="{2734159C-00F3-38E1-8AA0-5202860A9C24}"/>
+              </a:ext>
+            </a:extLst>
+          </p:cNvPr>
+          <p:cNvSpPr/>
+          <p:nvPr/>
+        </p:nvSpPr>
+        <p:spPr>
+          <a:xfrm>
+            <a:off x="7335122" y="3391680"/>
+            <a:ext cx="1698171" cy="564500"/>
+          </a:xfrm>
+          <a:prstGeom prst="rect">
+            <a:avLst/>
+          </a:prstGeom>
+          <a:solidFill>
+            <a:schemeClr val="bg1"/>
+          </a:solidFill>
+        </p:spPr>
+        <p:style>
+          <a:lnRef idx="2">
+            <a:schemeClr val="accent1">
+              <a:shade val="15000"/>
+            </a:schemeClr>
+          </a:lnRef>
+          <a:fillRef idx="1">
+            <a:schemeClr val="accent1"/>
+          </a:fillRef>
+          <a:effectRef idx="0">
+            <a:schemeClr val="accent1"/>
+          </a:effectRef>
+          <a:fontRef idx="minor">
+            <a:schemeClr val="lt1"/>
+          </a:fontRef>
+        </p:style>
+        <p:txBody>
+          <a:bodyPr rtlCol="0" anchor="ctr"/>
+          <a:lstStyle/>
+          <a:p>
+            <a:pPr algn="ctr"/>
+            <a:r>
+              <a:rPr lang="en-IE" dirty="0">
+                <a:solidFill>
+                  <a:schemeClr val="tx1"/>
+                </a:solidFill>
+              </a:rPr>
+              <a:t>Evaluate Models </a:t>
+            </a:r>
+          </a:p>
+        </p:txBody>
+      </p:sp>
+      <p:sp>
+        <p:nvSpPr>
+          <p:cNvPr id="11" name="Rectangle 10">
+            <a:extLst>
+              <a:ext uri="{FF2B5EF4-FFF2-40B4-BE49-F238E27FC236}">
+                <a16:creationId xmlns:a16="http://schemas.microsoft.com/office/drawing/2014/main" id="{03ED0361-4DC7-78C5-8DE8-B30F2B2014FB}"/>
+              </a:ext>
+            </a:extLst>
+          </p:cNvPr>
+          <p:cNvSpPr/>
+          <p:nvPr/>
+        </p:nvSpPr>
+        <p:spPr>
+          <a:xfrm>
+            <a:off x="9504783" y="3258718"/>
+            <a:ext cx="1698171" cy="830424"/>
+          </a:xfrm>
+          <a:prstGeom prst="rect">
+            <a:avLst/>
+          </a:prstGeom>
+          <a:solidFill>
+            <a:schemeClr val="bg1"/>
+          </a:solidFill>
+        </p:spPr>
+        <p:style>
+          <a:lnRef idx="2">
+            <a:schemeClr val="accent1">
+              <a:shade val="15000"/>
+            </a:schemeClr>
+          </a:lnRef>
+          <a:fillRef idx="1">
+            <a:schemeClr val="accent1"/>
+          </a:fillRef>
+          <a:effectRef idx="0">
+            <a:schemeClr val="accent1"/>
+          </a:effectRef>
+          <a:fontRef idx="minor">
+            <a:schemeClr val="lt1"/>
+          </a:fontRef>
+        </p:style>
+        <p:txBody>
+          <a:bodyPr rtlCol="0" anchor="ctr"/>
+          <a:lstStyle/>
+          <a:p>
+            <a:pPr algn="ctr"/>
+            <a:r>
+              <a:rPr lang="en-IE" dirty="0">
+                <a:solidFill>
+                  <a:schemeClr val="tx1"/>
+                </a:solidFill>
+              </a:rPr>
+              <a:t>Hyper-Parameter Tuning</a:t>
+            </a:r>
+          </a:p>
+        </p:txBody>
+      </p:sp>
+      <p:cxnSp>
+        <p:nvCxnSpPr>
+          <p:cNvPr id="15" name="Straight Arrow Connector 14">
+            <a:extLst>
+              <a:ext uri="{FF2B5EF4-FFF2-40B4-BE49-F238E27FC236}">
+                <a16:creationId xmlns:a16="http://schemas.microsoft.com/office/drawing/2014/main" id="{4527A180-A49A-0BD1-E403-EB53849FD469}"/>
+              </a:ext>
+            </a:extLst>
+          </p:cNvPr>
+          <p:cNvCxnSpPr>
+            <a:stCxn id="7" idx="2"/>
+            <a:endCxn id="6" idx="0"/>
+          </p:cNvCxnSpPr>
+          <p:nvPr/>
+        </p:nvCxnSpPr>
+        <p:spPr>
+          <a:xfrm>
+            <a:off x="2100649" y="2845837"/>
+            <a:ext cx="0" cy="489860"/>
+          </a:xfrm>
+          <a:prstGeom prst="straightConnector1">
+            <a:avLst/>
+          </a:prstGeom>
+          <a:ln>
+            <a:tailEnd type="triangle"/>
+          </a:ln>
+        </p:spPr>
+        <p:style>
+          <a:lnRef idx="1">
+            <a:schemeClr val="accent1"/>
+          </a:lnRef>
+          <a:fillRef idx="0">
+            <a:schemeClr val="accent1"/>
+          </a:fillRef>
+          <a:effectRef idx="0">
+            <a:schemeClr val="accent1"/>
+          </a:effectRef>
+          <a:fontRef idx="minor">
+            <a:schemeClr val="tx1"/>
+          </a:fontRef>
+        </p:style>
+      </p:cxnSp>
+      <p:cxnSp>
+        <p:nvCxnSpPr>
+          <p:cNvPr id="19" name="Straight Arrow Connector 18">
+            <a:extLst>
+              <a:ext uri="{FF2B5EF4-FFF2-40B4-BE49-F238E27FC236}">
+                <a16:creationId xmlns:a16="http://schemas.microsoft.com/office/drawing/2014/main" id="{7D432DAC-21CE-61D1-83B9-5C1608093428}"/>
+              </a:ext>
+            </a:extLst>
+          </p:cNvPr>
+          <p:cNvCxnSpPr>
+            <a:stCxn id="6" idx="3"/>
+            <a:endCxn id="9" idx="1"/>
+          </p:cNvCxnSpPr>
+          <p:nvPr/>
+        </p:nvCxnSpPr>
+        <p:spPr>
+          <a:xfrm>
+            <a:off x="3349690" y="3673931"/>
+            <a:ext cx="938693" cy="0"/>
+          </a:xfrm>
+          <a:prstGeom prst="straightConnector1">
+            <a:avLst/>
+          </a:prstGeom>
+          <a:ln>
+            <a:tailEnd type="triangle"/>
+          </a:ln>
+        </p:spPr>
+        <p:style>
+          <a:lnRef idx="1">
+            <a:schemeClr val="accent1"/>
+          </a:lnRef>
+          <a:fillRef idx="0">
+            <a:schemeClr val="accent1"/>
+          </a:fillRef>
+          <a:effectRef idx="0">
+            <a:schemeClr val="accent1"/>
+          </a:effectRef>
+          <a:fontRef idx="minor">
+            <a:schemeClr val="tx1"/>
+          </a:fontRef>
+        </p:style>
+      </p:cxnSp>
+      <p:cxnSp>
+        <p:nvCxnSpPr>
+          <p:cNvPr id="23" name="Straight Arrow Connector 22">
+            <a:extLst>
+              <a:ext uri="{FF2B5EF4-FFF2-40B4-BE49-F238E27FC236}">
+                <a16:creationId xmlns:a16="http://schemas.microsoft.com/office/drawing/2014/main" id="{B1A0E837-BD14-AA6C-B635-B43B9C4BF113}"/>
+              </a:ext>
+            </a:extLst>
+          </p:cNvPr>
+          <p:cNvCxnSpPr>
+            <a:stCxn id="9" idx="3"/>
+            <a:endCxn id="10" idx="1"/>
+          </p:cNvCxnSpPr>
+          <p:nvPr/>
+        </p:nvCxnSpPr>
+        <p:spPr>
+          <a:xfrm flipV="1">
+            <a:off x="6786465" y="3673930"/>
+            <a:ext cx="548657" cy="1"/>
+          </a:xfrm>
+          <a:prstGeom prst="straightConnector1">
+            <a:avLst/>
+          </a:prstGeom>
+          <a:ln>
+            <a:tailEnd type="triangle"/>
+          </a:ln>
+        </p:spPr>
+        <p:style>
+          <a:lnRef idx="1">
+            <a:schemeClr val="accent1"/>
+          </a:lnRef>
+          <a:fillRef idx="0">
+            <a:schemeClr val="accent1"/>
+          </a:fillRef>
+          <a:effectRef idx="0">
+            <a:schemeClr val="accent1"/>
+          </a:effectRef>
+          <a:fontRef idx="minor">
+            <a:schemeClr val="tx1"/>
+          </a:fontRef>
+        </p:style>
+      </p:cxnSp>
+      <p:cxnSp>
+        <p:nvCxnSpPr>
+          <p:cNvPr id="25" name="Straight Arrow Connector 24">
+            <a:extLst>
+              <a:ext uri="{FF2B5EF4-FFF2-40B4-BE49-F238E27FC236}">
+                <a16:creationId xmlns:a16="http://schemas.microsoft.com/office/drawing/2014/main" id="{60F7B129-3ED1-0C2B-EBBF-DD23E595C67F}"/>
+              </a:ext>
+            </a:extLst>
+          </p:cNvPr>
+          <p:cNvCxnSpPr>
+            <a:stCxn id="10" idx="3"/>
+            <a:endCxn id="11" idx="1"/>
+          </p:cNvCxnSpPr>
+          <p:nvPr/>
+        </p:nvCxnSpPr>
+        <p:spPr>
+          <a:xfrm>
+            <a:off x="9033293" y="3673930"/>
+            <a:ext cx="471490" cy="0"/>
+          </a:xfrm>
+          <a:prstGeom prst="straightConnector1">
+            <a:avLst/>
+          </a:prstGeom>
+          <a:ln>
+            <a:tailEnd type="triangle"/>
+          </a:ln>
+        </p:spPr>
+        <p:style>
+          <a:lnRef idx="1">
+            <a:schemeClr val="accent1"/>
+          </a:lnRef>
+          <a:fillRef idx="0">
+            <a:schemeClr val="accent1"/>
+          </a:fillRef>
+          <a:effectRef idx="0">
+            <a:schemeClr val="accent1"/>
+          </a:effectRef>
+          <a:fontRef idx="minor">
+            <a:schemeClr val="tx1"/>
+          </a:fontRef>
+        </p:style>
+      </p:cxnSp>
+      <p:sp>
+        <p:nvSpPr>
+          <p:cNvPr id="26" name="Rectangle 25">
+            <a:extLst>
+              <a:ext uri="{FF2B5EF4-FFF2-40B4-BE49-F238E27FC236}">
+                <a16:creationId xmlns:a16="http://schemas.microsoft.com/office/drawing/2014/main" id="{E691B300-4EE0-FCF3-6843-CBD9978C738E}"/>
+              </a:ext>
+            </a:extLst>
+          </p:cNvPr>
+          <p:cNvSpPr/>
+          <p:nvPr/>
+        </p:nvSpPr>
+        <p:spPr>
+          <a:xfrm>
+            <a:off x="4808376" y="5736773"/>
+            <a:ext cx="1698171" cy="564500"/>
+          </a:xfrm>
+          <a:prstGeom prst="rect">
+            <a:avLst/>
+          </a:prstGeom>
+          <a:solidFill>
+            <a:schemeClr val="bg1"/>
+          </a:solidFill>
+        </p:spPr>
+        <p:style>
+          <a:lnRef idx="2">
+            <a:schemeClr val="accent1">
+              <a:shade val="15000"/>
+            </a:schemeClr>
+          </a:lnRef>
+          <a:fillRef idx="1">
+            <a:schemeClr val="accent1"/>
+          </a:fillRef>
+          <a:effectRef idx="0">
+            <a:schemeClr val="accent1"/>
+          </a:effectRef>
+          <a:fontRef idx="minor">
+            <a:schemeClr val="lt1"/>
+          </a:fontRef>
+        </p:style>
+        <p:txBody>
+          <a:bodyPr rtlCol="0" anchor="ctr"/>
+          <a:lstStyle/>
+          <a:p>
+            <a:pPr algn="ctr"/>
+            <a:r>
+              <a:rPr lang="en-IE" dirty="0">
+                <a:solidFill>
+                  <a:schemeClr val="tx1"/>
+                </a:solidFill>
+              </a:rPr>
+              <a:t>Data Preparation</a:t>
+            </a:r>
+          </a:p>
+        </p:txBody>
+      </p:sp>
+      <p:cxnSp>
+        <p:nvCxnSpPr>
+          <p:cNvPr id="28" name="Straight Connector 27">
+            <a:extLst>
+              <a:ext uri="{FF2B5EF4-FFF2-40B4-BE49-F238E27FC236}">
+                <a16:creationId xmlns:a16="http://schemas.microsoft.com/office/drawing/2014/main" id="{DE92D5AD-65E1-3EE3-809A-0B0F89B49F2B}"/>
+              </a:ext>
+            </a:extLst>
+          </p:cNvPr>
+          <p:cNvCxnSpPr>
+            <a:cxnSpLocks/>
+            <a:stCxn id="11" idx="2"/>
+          </p:cNvCxnSpPr>
+          <p:nvPr/>
+        </p:nvCxnSpPr>
+        <p:spPr>
+          <a:xfrm>
+            <a:off x="10353869" y="4089142"/>
+            <a:ext cx="0" cy="1929881"/>
+          </a:xfrm>
+          <a:prstGeom prst="line">
+            <a:avLst/>
+          </a:prstGeom>
+        </p:spPr>
+        <p:style>
+          <a:lnRef idx="1">
+            <a:schemeClr val="accent1"/>
+          </a:lnRef>
+          <a:fillRef idx="0">
+            <a:schemeClr val="accent1"/>
+          </a:fillRef>
+          <a:effectRef idx="0">
+            <a:schemeClr val="accent1"/>
+          </a:effectRef>
+          <a:fontRef idx="minor">
+            <a:schemeClr val="tx1"/>
+          </a:fontRef>
+        </p:style>
+      </p:cxnSp>
+      <p:cxnSp>
+        <p:nvCxnSpPr>
+          <p:cNvPr id="31" name="Straight Arrow Connector 30">
+            <a:extLst>
+              <a:ext uri="{FF2B5EF4-FFF2-40B4-BE49-F238E27FC236}">
+                <a16:creationId xmlns:a16="http://schemas.microsoft.com/office/drawing/2014/main" id="{E6DAD78B-3702-6855-20A1-C2ED5B95B26C}"/>
+              </a:ext>
+            </a:extLst>
+          </p:cNvPr>
+          <p:cNvCxnSpPr>
+            <a:endCxn id="26" idx="3"/>
+          </p:cNvCxnSpPr>
+          <p:nvPr/>
+        </p:nvCxnSpPr>
+        <p:spPr>
+          <a:xfrm flipH="1">
+            <a:off x="6506547" y="6019023"/>
+            <a:ext cx="3847322" cy="0"/>
+          </a:xfrm>
+          <a:prstGeom prst="straightConnector1">
+            <a:avLst/>
+          </a:prstGeom>
+          <a:ln>
+            <a:tailEnd type="triangle"/>
+          </a:ln>
+        </p:spPr>
+        <p:style>
+          <a:lnRef idx="1">
+            <a:schemeClr val="accent1"/>
+          </a:lnRef>
+          <a:fillRef idx="0">
+            <a:schemeClr val="accent1"/>
+          </a:fillRef>
+          <a:effectRef idx="0">
+            <a:schemeClr val="accent1"/>
+          </a:effectRef>
+          <a:fontRef idx="minor">
+            <a:schemeClr val="tx1"/>
+          </a:fontRef>
+        </p:style>
+      </p:cxnSp>
+      <p:cxnSp>
+        <p:nvCxnSpPr>
+          <p:cNvPr id="33" name="Straight Connector 32">
+            <a:extLst>
+              <a:ext uri="{FF2B5EF4-FFF2-40B4-BE49-F238E27FC236}">
+                <a16:creationId xmlns:a16="http://schemas.microsoft.com/office/drawing/2014/main" id="{5426C929-3515-9D3C-21CE-EFCE3B21174F}"/>
+              </a:ext>
+            </a:extLst>
+          </p:cNvPr>
+          <p:cNvCxnSpPr>
+            <a:cxnSpLocks/>
+            <a:stCxn id="26" idx="1"/>
+          </p:cNvCxnSpPr>
+          <p:nvPr/>
+        </p:nvCxnSpPr>
+        <p:spPr>
+          <a:xfrm flipH="1">
+            <a:off x="2100649" y="6019023"/>
+            <a:ext cx="2707727" cy="0"/>
+          </a:xfrm>
+          <a:prstGeom prst="line">
+            <a:avLst/>
+          </a:prstGeom>
+        </p:spPr>
+        <p:style>
+          <a:lnRef idx="1">
+            <a:schemeClr val="accent1"/>
+          </a:lnRef>
+          <a:fillRef idx="0">
+            <a:schemeClr val="accent1"/>
+          </a:fillRef>
+          <a:effectRef idx="0">
+            <a:schemeClr val="accent1"/>
+          </a:effectRef>
+          <a:fontRef idx="minor">
+            <a:schemeClr val="tx1"/>
+          </a:fontRef>
+        </p:style>
+      </p:cxnSp>
+      <p:cxnSp>
+        <p:nvCxnSpPr>
+          <p:cNvPr id="35" name="Straight Arrow Connector 34">
+            <a:extLst>
+              <a:ext uri="{FF2B5EF4-FFF2-40B4-BE49-F238E27FC236}">
+                <a16:creationId xmlns:a16="http://schemas.microsoft.com/office/drawing/2014/main" id="{855D3888-3F74-F3A9-0A23-752611D04D77}"/>
+              </a:ext>
+            </a:extLst>
+          </p:cNvPr>
+          <p:cNvCxnSpPr>
+            <a:cxnSpLocks/>
+            <a:endCxn id="6" idx="2"/>
+          </p:cNvCxnSpPr>
+          <p:nvPr/>
+        </p:nvCxnSpPr>
+        <p:spPr>
+          <a:xfrm flipV="1">
+            <a:off x="2100649" y="4012164"/>
+            <a:ext cx="0" cy="2006859"/>
+          </a:xfrm>
+          <a:prstGeom prst="straightConnector1">
+            <a:avLst/>
+          </a:prstGeom>
+          <a:ln>
+            <a:tailEnd type="triangle"/>
+          </a:ln>
+        </p:spPr>
+        <p:style>
+          <a:lnRef idx="1">
+            <a:schemeClr val="accent1"/>
+          </a:lnRef>
+          <a:fillRef idx="0">
+            <a:schemeClr val="accent1"/>
+          </a:fillRef>
+          <a:effectRef idx="0">
+            <a:schemeClr val="accent1"/>
+          </a:effectRef>
+          <a:fontRef idx="minor">
+            <a:schemeClr val="tx1"/>
+          </a:fontRef>
+        </p:style>
+      </p:cxnSp>
+      <p:sp>
+        <p:nvSpPr>
+          <p:cNvPr id="22" name="Speech Bubble: Rectangle 21">
+            <a:extLst>
+              <a:ext uri="{FF2B5EF4-FFF2-40B4-BE49-F238E27FC236}">
+                <a16:creationId xmlns:a16="http://schemas.microsoft.com/office/drawing/2014/main" id="{8EE1AF10-E71B-7728-FE85-E031AA1B943F}"/>
+              </a:ext>
+            </a:extLst>
+          </p:cNvPr>
+          <p:cNvSpPr/>
+          <p:nvPr/>
+        </p:nvSpPr>
+        <p:spPr>
+          <a:xfrm>
+            <a:off x="6506547" y="4982554"/>
+            <a:ext cx="2998235" cy="903476"/>
+          </a:xfrm>
+          <a:prstGeom prst="wedgeRectCallout">
+            <a:avLst/>
+          </a:prstGeom>
+        </p:spPr>
+        <p:style>
+          <a:lnRef idx="2">
+            <a:schemeClr val="accent1">
+              <a:shade val="15000"/>
+            </a:schemeClr>
+          </a:lnRef>
+          <a:fillRef idx="1">
+            <a:schemeClr val="accent1"/>
+          </a:fillRef>
+          <a:effectRef idx="0">
+            <a:schemeClr val="accent1"/>
+          </a:effectRef>
+          <a:fontRef idx="minor">
+            <a:schemeClr val="lt1"/>
+          </a:fontRef>
+        </p:style>
+        <p:txBody>
+          <a:bodyPr rtlCol="0" anchor="ctr"/>
+          <a:lstStyle/>
+          <a:p>
+            <a:pPr algn="ctr"/>
+            <a:r>
+              <a:rPr lang="en-IE" dirty="0"/>
+              <a:t>Iterative data preparation to achieve optimal performing model.</a:t>
+            </a:r>
+          </a:p>
+        </p:txBody>
+      </p:sp>
+    </p:spTree>
+    <p:extLst>
+      <p:ext uri="{BB962C8B-B14F-4D97-AF65-F5344CB8AC3E}">
+        <p14:creationId xmlns:p14="http://schemas.microsoft.com/office/powerpoint/2010/main" val="1428191632"/>
+      </p:ext>
+    </p:extLst>
+  </p:cSld>
+  <p:clrMapOvr>
+    <a:masterClrMapping/>
+  </p:clrMapOvr>
+</p:sld>
+</file>
+
+<file path=ppt/slides/slide7.xml><?xml version="1.0" encoding="utf-8"?>
+<p:sld xmlns:a="http://schemas.openxmlformats.org/drawingml/2006/main" xmlns:r="http://schemas.openxmlformats.org/officeDocument/2006/relationships" xmlns:p="http://schemas.openxmlformats.org/presentationml/2006/main">
+  <p:cSld>
+    <p:spTree>
+      <p:nvGrpSpPr>
+        <p:cNvPr id="1" name=""/>
+        <p:cNvGrpSpPr/>
+        <p:nvPr/>
+      </p:nvGrpSpPr>
+      <p:grpSpPr>
+        <a:xfrm>
+          <a:off x="0" y="0"/>
+          <a:ext cx="0" cy="0"/>
+          <a:chOff x="0" y="0"/>
+          <a:chExt cx="0" cy="0"/>
+        </a:xfrm>
+      </p:grpSpPr>
+    </p:spTree>
+    <p:extLst>
+      <p:ext uri="{BB962C8B-B14F-4D97-AF65-F5344CB8AC3E}">
+        <p14:creationId xmlns:p14="http://schemas.microsoft.com/office/powerpoint/2010/main" val="2664822655"/>
+      </p:ext>
+    </p:extLst>
+  </p:cSld>
+  <p:clrMapOvr>
+    <a:masterClrMapping/>
+  </p:clrMapOvr>
+</p:sld>
+</file>
+
 <file path=ppt/theme/theme1.xml><?xml version="1.0" encoding="utf-8"?>
 <a:theme xmlns:a="http://schemas.openxmlformats.org/drawingml/2006/main" name="Office Theme">
   <a:themeElements>

</xml_diff>